<commit_message>
Compiled group work and start of PowerPoint
</commit_message>
<xml_diff>
--- a/Airplane_Crashes/Project 1 Presentation.pptx
+++ b/Airplane_Crashes/Project 1 Presentation.pptx
@@ -6149,8 +6149,8 @@
         </p:blipFill>
         <p:spPr>
           <a:xfrm>
-            <a:off x="6265863" y="2667000"/>
-            <a:ext cx="4686300" cy="3124199"/>
+            <a:off x="6265864" y="2667000"/>
+            <a:ext cx="4686298" cy="3124199"/>
           </a:xfrm>
         </p:spPr>
       </p:pic>

</xml_diff>